<commit_message>
Corrected gtsummary pdf and ppt and uploaded new versions
Fixed description of Default type argument for add_p
</commit_message>
<xml_diff>
--- a/powerpoints/gtsummary.pptx
+++ b/powerpoints/gtsummary.pptx
@@ -2411,7 +2411,7 @@
           </a:ln>
           <a:extLst>
             <a:ext uri="{C572A759-6A51-4108-AA02-DFA0A04FC94B}">
-              <ma14:wrappingTextBoxFlag xmlns="" xmlns:m="http://schemas.openxmlformats.org/officeDocument/2006/math" xmlns:a14="http://schemas.microsoft.com/office/drawing/2010/main" xmlns:ma14="http://schemas.microsoft.com/office/mac/drawingml/2011/main" val="1"/>
+              <ma14:wrappingTextBoxFlag xmlns:ma14="http://schemas.microsoft.com/office/mac/drawingml/2011/main" xmlns:a14="http://schemas.microsoft.com/office/drawing/2010/main" xmlns:m="http://schemas.openxmlformats.org/officeDocument/2006/math" xmlns="" val="1"/>
             </a:ext>
           </a:extLst>
         </p:spPr>
@@ -2450,7 +2450,7 @@
           </a:ln>
           <a:extLst>
             <a:ext uri="{C572A759-6A51-4108-AA02-DFA0A04FC94B}">
-              <ma14:wrappingTextBoxFlag xmlns="" xmlns:m="http://schemas.openxmlformats.org/officeDocument/2006/math" xmlns:a14="http://schemas.microsoft.com/office/drawing/2010/main" xmlns:ma14="http://schemas.microsoft.com/office/mac/drawingml/2011/main" val="1"/>
+              <ma14:wrappingTextBoxFlag xmlns:ma14="http://schemas.microsoft.com/office/mac/drawingml/2011/main" xmlns:a14="http://schemas.microsoft.com/office/drawing/2010/main" xmlns:m="http://schemas.openxmlformats.org/officeDocument/2006/math" xmlns="" val="1"/>
             </a:ext>
           </a:extLst>
         </p:spPr>
@@ -3595,7 +3595,7 @@
           </a:ln>
           <a:extLst>
             <a:ext uri="{C572A759-6A51-4108-AA02-DFA0A04FC94B}">
-              <ma14:wrappingTextBoxFlag xmlns="" xmlns:m="http://schemas.openxmlformats.org/officeDocument/2006/math" xmlns:a14="http://schemas.microsoft.com/office/drawing/2010/main" xmlns:ma14="http://schemas.microsoft.com/office/mac/drawingml/2011/main" val="1"/>
+              <ma14:wrappingTextBoxFlag xmlns:ma14="http://schemas.microsoft.com/office/mac/drawingml/2011/main" xmlns:a14="http://schemas.microsoft.com/office/drawing/2010/main" xmlns:m="http://schemas.openxmlformats.org/officeDocument/2006/math" xmlns="" val="1"/>
             </a:ext>
           </a:extLst>
         </p:spPr>
@@ -3641,7 +3641,7 @@
           </a:ln>
           <a:extLst>
             <a:ext uri="{C572A759-6A51-4108-AA02-DFA0A04FC94B}">
-              <ma14:wrappingTextBoxFlag xmlns="" xmlns:m="http://schemas.openxmlformats.org/officeDocument/2006/math" xmlns:a14="http://schemas.microsoft.com/office/drawing/2010/main" xmlns:ma14="http://schemas.microsoft.com/office/mac/drawingml/2011/main" val="1"/>
+              <ma14:wrappingTextBoxFlag xmlns:ma14="http://schemas.microsoft.com/office/mac/drawingml/2011/main" xmlns:a14="http://schemas.microsoft.com/office/drawing/2010/main" xmlns:m="http://schemas.openxmlformats.org/officeDocument/2006/math" xmlns="" val="1"/>
             </a:ext>
           </a:extLst>
         </p:spPr>
@@ -3822,7 +3822,7 @@
           </a:ln>
           <a:extLst>
             <a:ext uri="{C572A759-6A51-4108-AA02-DFA0A04FC94B}">
-              <ma14:wrappingTextBoxFlag xmlns="" xmlns:m="http://schemas.openxmlformats.org/officeDocument/2006/math" xmlns:a14="http://schemas.microsoft.com/office/drawing/2010/main" xmlns:ma14="http://schemas.microsoft.com/office/mac/drawingml/2011/main" val="1"/>
+              <ma14:wrappingTextBoxFlag xmlns:ma14="http://schemas.microsoft.com/office/mac/drawingml/2011/main" xmlns:a14="http://schemas.microsoft.com/office/drawing/2010/main" xmlns:m="http://schemas.openxmlformats.org/officeDocument/2006/math" xmlns="" val="1"/>
             </a:ext>
           </a:extLst>
         </p:spPr>
@@ -4228,7 +4228,7 @@
             </a:effectLst>
             <a:extLst>
               <a:ext uri="{C572A759-6A51-4108-AA02-DFA0A04FC94B}">
-                <ma14:wrappingTextBoxFlag xmlns="" xmlns:m="http://schemas.openxmlformats.org/officeDocument/2006/math" xmlns:a14="http://schemas.microsoft.com/office/drawing/2010/main" xmlns:ma14="http://schemas.microsoft.com/office/mac/drawingml/2011/main" val="1"/>
+                <ma14:wrappingTextBoxFlag xmlns:ma14="http://schemas.microsoft.com/office/mac/drawingml/2011/main" xmlns:a14="http://schemas.microsoft.com/office/drawing/2010/main" xmlns:m="http://schemas.openxmlformats.org/officeDocument/2006/math" xmlns="" val="1"/>
               </a:ext>
             </a:extLst>
           </p:spPr>
@@ -4288,7 +4288,7 @@
             <a:effectLst/>
             <a:extLst>
               <a:ext uri="{C572A759-6A51-4108-AA02-DFA0A04FC94B}">
-                <ma14:wrappingTextBoxFlag xmlns="" xmlns:m="http://schemas.openxmlformats.org/officeDocument/2006/math" xmlns:a14="http://schemas.microsoft.com/office/drawing/2010/main" xmlns:ma14="http://schemas.microsoft.com/office/mac/drawingml/2011/main" val="1"/>
+                <ma14:wrappingTextBoxFlag xmlns:ma14="http://schemas.microsoft.com/office/mac/drawingml/2011/main" xmlns:a14="http://schemas.microsoft.com/office/drawing/2010/main" xmlns:m="http://schemas.openxmlformats.org/officeDocument/2006/math" xmlns="" val="1"/>
               </a:ext>
             </a:extLst>
           </p:spPr>
@@ -4457,7 +4457,7 @@
             <a:effectLst/>
             <a:extLst>
               <a:ext uri="{C572A759-6A51-4108-AA02-DFA0A04FC94B}">
-                <ma14:wrappingTextBoxFlag xmlns="" xmlns:m="http://schemas.openxmlformats.org/officeDocument/2006/math" xmlns:a14="http://schemas.microsoft.com/office/drawing/2010/main" xmlns:ma14="http://schemas.microsoft.com/office/mac/drawingml/2011/main" val="1"/>
+                <ma14:wrappingTextBoxFlag xmlns:ma14="http://schemas.microsoft.com/office/mac/drawingml/2011/main" xmlns:a14="http://schemas.microsoft.com/office/drawing/2010/main" xmlns:m="http://schemas.openxmlformats.org/officeDocument/2006/math" xmlns="" val="1"/>
               </a:ext>
             </a:extLst>
           </p:spPr>
@@ -4513,7 +4513,7 @@
             <a:effectLst/>
             <a:extLst>
               <a:ext uri="{C572A759-6A51-4108-AA02-DFA0A04FC94B}">
-                <ma14:wrappingTextBoxFlag xmlns="" xmlns:m="http://schemas.openxmlformats.org/officeDocument/2006/math" xmlns:a14="http://schemas.microsoft.com/office/drawing/2010/main" xmlns:ma14="http://schemas.microsoft.com/office/mac/drawingml/2011/main" val="1"/>
+                <ma14:wrappingTextBoxFlag xmlns:ma14="http://schemas.microsoft.com/office/mac/drawingml/2011/main" xmlns:a14="http://schemas.microsoft.com/office/drawing/2010/main" xmlns:m="http://schemas.openxmlformats.org/officeDocument/2006/math" xmlns="" val="1"/>
               </a:ext>
             </a:extLst>
           </p:spPr>
@@ -4681,7 +4681,7 @@
             <a:effectLst/>
             <a:extLst>
               <a:ext uri="{C572A759-6A51-4108-AA02-DFA0A04FC94B}">
-                <ma14:wrappingTextBoxFlag xmlns="" xmlns:m="http://schemas.openxmlformats.org/officeDocument/2006/math" xmlns:a14="http://schemas.microsoft.com/office/drawing/2010/main" xmlns:ma14="http://schemas.microsoft.com/office/mac/drawingml/2011/main" val="1"/>
+                <ma14:wrappingTextBoxFlag xmlns:ma14="http://schemas.microsoft.com/office/mac/drawingml/2011/main" xmlns:a14="http://schemas.microsoft.com/office/drawing/2010/main" xmlns:m="http://schemas.openxmlformats.org/officeDocument/2006/math" xmlns="" val="1"/>
               </a:ext>
             </a:extLst>
           </p:spPr>
@@ -4749,7 +4749,7 @@
             <a:effectLst/>
             <a:extLst>
               <a:ext uri="{C572A759-6A51-4108-AA02-DFA0A04FC94B}">
-                <ma14:wrappingTextBoxFlag xmlns="" xmlns:m="http://schemas.openxmlformats.org/officeDocument/2006/math" xmlns:a14="http://schemas.microsoft.com/office/drawing/2010/main" xmlns:ma14="http://schemas.microsoft.com/office/mac/drawingml/2011/main" val="1"/>
+                <ma14:wrappingTextBoxFlag xmlns:ma14="http://schemas.microsoft.com/office/mac/drawingml/2011/main" xmlns:a14="http://schemas.microsoft.com/office/drawing/2010/main" xmlns:m="http://schemas.openxmlformats.org/officeDocument/2006/math" xmlns="" val="1"/>
               </a:ext>
             </a:extLst>
           </p:spPr>
@@ -4891,7 +4891,7 @@
           <a:effectLst/>
           <a:extLst>
             <a:ext uri="{C572A759-6A51-4108-AA02-DFA0A04FC94B}">
-              <ma14:wrappingTextBoxFlag xmlns="" xmlns:m="http://schemas.openxmlformats.org/officeDocument/2006/math" xmlns:a14="http://schemas.microsoft.com/office/drawing/2010/main" xmlns:ma14="http://schemas.microsoft.com/office/mac/drawingml/2011/main" val="1"/>
+              <ma14:wrappingTextBoxFlag xmlns:ma14="http://schemas.microsoft.com/office/mac/drawingml/2011/main" xmlns:a14="http://schemas.microsoft.com/office/drawing/2010/main" xmlns:m="http://schemas.openxmlformats.org/officeDocument/2006/math" xmlns="" val="1"/>
             </a:ext>
           </a:extLst>
         </p:spPr>
@@ -5671,7 +5671,7 @@
           <a:effectLst/>
           <a:extLst>
             <a:ext uri="{C572A759-6A51-4108-AA02-DFA0A04FC94B}">
-              <ma14:wrappingTextBoxFlag xmlns="" xmlns:m="http://schemas.openxmlformats.org/officeDocument/2006/math" xmlns:a14="http://schemas.microsoft.com/office/drawing/2010/main" xmlns:ma14="http://schemas.microsoft.com/office/mac/drawingml/2011/main" val="1"/>
+              <ma14:wrappingTextBoxFlag xmlns:ma14="http://schemas.microsoft.com/office/mac/drawingml/2011/main" xmlns:a14="http://schemas.microsoft.com/office/drawing/2010/main" xmlns:m="http://schemas.openxmlformats.org/officeDocument/2006/math" xmlns="" val="1"/>
             </a:ext>
           </a:extLst>
         </p:spPr>
@@ -5765,7 +5765,7 @@
           <a:effectLst/>
           <a:extLst>
             <a:ext uri="{C572A759-6A51-4108-AA02-DFA0A04FC94B}">
-              <ma14:wrappingTextBoxFlag xmlns="" xmlns:m="http://schemas.openxmlformats.org/officeDocument/2006/math" xmlns:a14="http://schemas.microsoft.com/office/drawing/2010/main" xmlns:ma14="http://schemas.microsoft.com/office/mac/drawingml/2011/main" val="1"/>
+              <ma14:wrappingTextBoxFlag xmlns:ma14="http://schemas.microsoft.com/office/mac/drawingml/2011/main" xmlns:a14="http://schemas.microsoft.com/office/drawing/2010/main" xmlns:m="http://schemas.openxmlformats.org/officeDocument/2006/math" xmlns="" val="1"/>
             </a:ext>
           </a:extLst>
         </p:spPr>
@@ -5827,7 +5827,7 @@
           <a:effectLst/>
           <a:extLst>
             <a:ext uri="{C572A759-6A51-4108-AA02-DFA0A04FC94B}">
-              <ma14:wrappingTextBoxFlag xmlns="" xmlns:m="http://schemas.openxmlformats.org/officeDocument/2006/math" xmlns:a14="http://schemas.microsoft.com/office/drawing/2010/main" xmlns:ma14="http://schemas.microsoft.com/office/mac/drawingml/2011/main" val="1"/>
+              <ma14:wrappingTextBoxFlag xmlns:ma14="http://schemas.microsoft.com/office/mac/drawingml/2011/main" xmlns:a14="http://schemas.microsoft.com/office/drawing/2010/main" xmlns:m="http://schemas.openxmlformats.org/officeDocument/2006/math" xmlns="" val="1"/>
             </a:ext>
           </a:extLst>
         </p:spPr>
@@ -5970,7 +5970,7 @@
           <a:effectLst/>
           <a:extLst>
             <a:ext uri="{C572A759-6A51-4108-AA02-DFA0A04FC94B}">
-              <ma14:wrappingTextBoxFlag xmlns="" xmlns:m="http://schemas.openxmlformats.org/officeDocument/2006/math" xmlns:a14="http://schemas.microsoft.com/office/drawing/2010/main" xmlns:ma14="http://schemas.microsoft.com/office/mac/drawingml/2011/main" val="1"/>
+              <ma14:wrappingTextBoxFlag xmlns:ma14="http://schemas.microsoft.com/office/mac/drawingml/2011/main" xmlns:a14="http://schemas.microsoft.com/office/drawing/2010/main" xmlns:m="http://schemas.openxmlformats.org/officeDocument/2006/math" xmlns="" val="1"/>
             </a:ext>
           </a:extLst>
         </p:spPr>
@@ -6346,7 +6346,7 @@
               </a:effectLst>
               <a:extLst>
                 <a:ext uri="{C572A759-6A51-4108-AA02-DFA0A04FC94B}">
-                  <ma14:wrappingTextBoxFlag xmlns="" xmlns:m="http://schemas.openxmlformats.org/officeDocument/2006/math" xmlns:a14="http://schemas.microsoft.com/office/drawing/2010/main" xmlns:ma14="http://schemas.microsoft.com/office/mac/drawingml/2011/main" val="1"/>
+                  <ma14:wrappingTextBoxFlag xmlns:ma14="http://schemas.microsoft.com/office/mac/drawingml/2011/main" xmlns:a14="http://schemas.microsoft.com/office/drawing/2010/main" xmlns:m="http://schemas.openxmlformats.org/officeDocument/2006/math" xmlns="" val="1"/>
                 </a:ext>
               </a:extLst>
             </p:spPr>
@@ -6402,7 +6402,7 @@
               <a:effectLst/>
               <a:extLst>
                 <a:ext uri="{C572A759-6A51-4108-AA02-DFA0A04FC94B}">
-                  <ma14:wrappingTextBoxFlag xmlns="" xmlns:m="http://schemas.openxmlformats.org/officeDocument/2006/math" xmlns:a14="http://schemas.microsoft.com/office/drawing/2010/main" xmlns:ma14="http://schemas.microsoft.com/office/mac/drawingml/2011/main" val="1"/>
+                  <ma14:wrappingTextBoxFlag xmlns:ma14="http://schemas.microsoft.com/office/mac/drawingml/2011/main" xmlns:a14="http://schemas.microsoft.com/office/drawing/2010/main" xmlns:m="http://schemas.openxmlformats.org/officeDocument/2006/math" xmlns="" val="1"/>
                 </a:ext>
               </a:extLst>
             </p:spPr>
@@ -6573,7 +6573,7 @@
               </a:effectLst>
               <a:extLst>
                 <a:ext uri="{C572A759-6A51-4108-AA02-DFA0A04FC94B}">
-                  <ma14:wrappingTextBoxFlag xmlns="" xmlns:m="http://schemas.openxmlformats.org/officeDocument/2006/math" xmlns:a14="http://schemas.microsoft.com/office/drawing/2010/main" xmlns:ma14="http://schemas.microsoft.com/office/mac/drawingml/2011/main" val="1"/>
+                  <ma14:wrappingTextBoxFlag xmlns:ma14="http://schemas.microsoft.com/office/mac/drawingml/2011/main" xmlns:a14="http://schemas.microsoft.com/office/drawing/2010/main" xmlns:m="http://schemas.openxmlformats.org/officeDocument/2006/math" xmlns="" val="1"/>
                 </a:ext>
               </a:extLst>
             </p:spPr>
@@ -6629,7 +6629,7 @@
               <a:effectLst/>
               <a:extLst>
                 <a:ext uri="{C572A759-6A51-4108-AA02-DFA0A04FC94B}">
-                  <ma14:wrappingTextBoxFlag xmlns="" xmlns:m="http://schemas.openxmlformats.org/officeDocument/2006/math" xmlns:a14="http://schemas.microsoft.com/office/drawing/2010/main" xmlns:ma14="http://schemas.microsoft.com/office/mac/drawingml/2011/main" val="1"/>
+                  <ma14:wrappingTextBoxFlag xmlns:ma14="http://schemas.microsoft.com/office/mac/drawingml/2011/main" xmlns:a14="http://schemas.microsoft.com/office/drawing/2010/main" xmlns:m="http://schemas.openxmlformats.org/officeDocument/2006/math" xmlns="" val="1"/>
                 </a:ext>
               </a:extLst>
             </p:spPr>
@@ -7185,7 +7185,7 @@
             <a:effectLst/>
             <a:extLst>
               <a:ext uri="{C572A759-6A51-4108-AA02-DFA0A04FC94B}">
-                <ma14:wrappingTextBoxFlag xmlns="" xmlns:m="http://schemas.openxmlformats.org/officeDocument/2006/math" xmlns:a14="http://schemas.microsoft.com/office/drawing/2010/main" xmlns:ma14="http://schemas.microsoft.com/office/mac/drawingml/2011/main" val="1"/>
+                <ma14:wrappingTextBoxFlag xmlns:ma14="http://schemas.microsoft.com/office/mac/drawingml/2011/main" xmlns:a14="http://schemas.microsoft.com/office/drawing/2010/main" xmlns:m="http://schemas.openxmlformats.org/officeDocument/2006/math" xmlns="" val="1"/>
               </a:ext>
             </a:extLst>
           </p:spPr>
@@ -7850,7 +7850,7 @@
           <a:effectLst/>
           <a:extLst>
             <a:ext uri="{C572A759-6A51-4108-AA02-DFA0A04FC94B}">
-              <ma14:wrappingTextBoxFlag xmlns="" xmlns:m="http://schemas.openxmlformats.org/officeDocument/2006/math" xmlns:a14="http://schemas.microsoft.com/office/drawing/2010/main" xmlns:ma14="http://schemas.microsoft.com/office/mac/drawingml/2011/main" val="1"/>
+              <ma14:wrappingTextBoxFlag xmlns:ma14="http://schemas.microsoft.com/office/mac/drawingml/2011/main" xmlns:a14="http://schemas.microsoft.com/office/drawing/2010/main" xmlns:m="http://schemas.openxmlformats.org/officeDocument/2006/math" xmlns="" val="1"/>
             </a:ext>
           </a:extLst>
         </p:spPr>
@@ -7912,7 +7912,7 @@
           <a:effectLst/>
           <a:extLst>
             <a:ext uri="{C572A759-6A51-4108-AA02-DFA0A04FC94B}">
-              <ma14:wrappingTextBoxFlag xmlns="" xmlns:m="http://schemas.openxmlformats.org/officeDocument/2006/math" xmlns:a14="http://schemas.microsoft.com/office/drawing/2010/main" xmlns:ma14="http://schemas.microsoft.com/office/mac/drawingml/2011/main" val="1"/>
+              <ma14:wrappingTextBoxFlag xmlns:ma14="http://schemas.microsoft.com/office/mac/drawingml/2011/main" xmlns:a14="http://schemas.microsoft.com/office/drawing/2010/main" xmlns:m="http://schemas.openxmlformats.org/officeDocument/2006/math" xmlns="" val="1"/>
             </a:ext>
           </a:extLst>
         </p:spPr>
@@ -8005,6 +8005,19 @@
               </a:spcBef>
             </a:pPr>
             <a:r>
+              <a:rPr lang="en-US" b="0">
+                <a:ln>
+                  <a:solidFill>
+                    <a:schemeClr val="tx1"/>
+                  </a:solidFill>
+                </a:ln>
+                <a:solidFill>
+                  <a:schemeClr val="tx1"/>
+                </a:solidFill>
+              </a:rPr>
+              <a:t>Argument       Default</a:t>
+            </a:r>
+            <a:r>
               <a:rPr lang="en-US" b="0" dirty="0">
                 <a:ln>
                   <a:solidFill>
@@ -8015,7 +8028,7 @@
                   <a:schemeClr val="tx1"/>
                 </a:solidFill>
               </a:rPr>
-              <a:t>Argument      Default		     Input			                                       Effect on table</a:t>
+              <a:t>		                     Input			                     Effect on table</a:t>
             </a:r>
             <a:endParaRPr kumimoji="0" lang="en-US" b="0" i="0" u="none" strike="noStrike" cap="none" spc="0" normalizeH="0" baseline="0" dirty="0">
               <a:ln>
@@ -8070,7 +8083,7 @@
           </a:effectLst>
           <a:extLst>
             <a:ext uri="{C572A759-6A51-4108-AA02-DFA0A04FC94B}">
-              <ma14:wrappingTextBoxFlag xmlns="" xmlns:m="http://schemas.openxmlformats.org/officeDocument/2006/math" xmlns:a14="http://schemas.microsoft.com/office/drawing/2010/main" xmlns:ma14="http://schemas.microsoft.com/office/mac/drawingml/2011/main" val="1"/>
+              <ma14:wrappingTextBoxFlag xmlns:ma14="http://schemas.microsoft.com/office/mac/drawingml/2011/main" xmlns:a14="http://schemas.microsoft.com/office/drawing/2010/main" xmlns:m="http://schemas.openxmlformats.org/officeDocument/2006/math" xmlns="" val="1"/>
             </a:ext>
           </a:extLst>
         </p:spPr>
@@ -8126,7 +8139,7 @@
           <a:effectLst/>
           <a:extLst>
             <a:ext uri="{C572A759-6A51-4108-AA02-DFA0A04FC94B}">
-              <ma14:wrappingTextBoxFlag xmlns="" xmlns:m="http://schemas.openxmlformats.org/officeDocument/2006/math" xmlns:a14="http://schemas.microsoft.com/office/drawing/2010/main" xmlns:ma14="http://schemas.microsoft.com/office/mac/drawingml/2011/main" val="1"/>
+              <ma14:wrappingTextBoxFlag xmlns:ma14="http://schemas.microsoft.com/office/mac/drawingml/2011/main" xmlns:a14="http://schemas.microsoft.com/office/drawing/2010/main" xmlns:m="http://schemas.openxmlformats.org/officeDocument/2006/math" xmlns="" val="1"/>
             </a:ext>
           </a:extLst>
         </p:spPr>
@@ -8176,7 +8189,7 @@
           <p:nvPr>
             <p:extLst>
               <p:ext uri="{D42A27DB-BD31-4B8C-83A1-F6EECF244321}">
-                <p14:modId xmlns:p14="http://schemas.microsoft.com/office/powerpoint/2010/main" val="1979805968"/>
+                <p14:modId xmlns:p14="http://schemas.microsoft.com/office/powerpoint/2010/main" val="1921529433"/>
               </p:ext>
             </p:extLst>
           </p:nvPr>
@@ -8199,21 +8212,21 @@
                     </a:ext>
                   </a:extLst>
                 </a:gridCol>
-                <a:gridCol w="1662699">
+                <a:gridCol w="2145070">
                   <a:extLst>
                     <a:ext uri="{9D8B030D-6E8A-4147-A177-3AD203B41FA5}">
                       <a16:colId xmlns:a16="http://schemas.microsoft.com/office/drawing/2014/main" val="956245227"/>
                     </a:ext>
                   </a:extLst>
                 </a:gridCol>
-                <a:gridCol w="2798270">
+                <a:gridCol w="2310809">
                   <a:extLst>
                     <a:ext uri="{9D8B030D-6E8A-4147-A177-3AD203B41FA5}">
                       <a16:colId xmlns:a16="http://schemas.microsoft.com/office/drawing/2014/main" val="377489258"/>
                     </a:ext>
                   </a:extLst>
                 </a:gridCol>
-                <a:gridCol w="1973394">
+                <a:gridCol w="1978484">
                   <a:extLst>
                     <a:ext uri="{9D8B030D-6E8A-4147-A177-3AD203B41FA5}">
                       <a16:colId xmlns:a16="http://schemas.microsoft.com/office/drawing/2014/main" val="2674764155"/>
@@ -8264,14 +8277,7 @@
                       <a:pPr algn="l"/>
                       <a:r>
                         <a:rPr lang="en-US" sz="1000" dirty="0"/>
-                        <a:t>Categorical, cell counts ≥5:</a:t>
-                      </a:r>
-                    </a:p>
-                    <a:p>
-                      <a:pPr algn="l"/>
-                      <a:r>
-                        <a:rPr lang="en-US" sz="1000" dirty="0"/>
-                        <a:t> </a:t>
+                        <a:t>Categorical, expected cell counts ≥5: </a:t>
                       </a:r>
                       <a:r>
                         <a:rPr lang="en-US" sz="1000" b="1" dirty="0"/>
@@ -8304,7 +8310,7 @@
                       <a:pPr algn="l"/>
                       <a:r>
                         <a:rPr lang="en-US" sz="1000" dirty="0"/>
-                        <a:t>Categorical, cell counts &gt; 5: </a:t>
+                        <a:t>Categorical, expected cell counts &lt; 5: </a:t>
                       </a:r>
                       <a:r>
                         <a:rPr lang="en-US" sz="1000" b="1" dirty="0"/>
@@ -8713,7 +8719,7 @@
           <a:effectLst/>
           <a:extLst>
             <a:ext uri="{C572A759-6A51-4108-AA02-DFA0A04FC94B}">
-              <ma14:wrappingTextBoxFlag xmlns="" xmlns:m="http://schemas.openxmlformats.org/officeDocument/2006/math" xmlns:a14="http://schemas.microsoft.com/office/drawing/2010/main" xmlns:ma14="http://schemas.microsoft.com/office/mac/drawingml/2011/main" val="1"/>
+              <ma14:wrappingTextBoxFlag xmlns:ma14="http://schemas.microsoft.com/office/mac/drawingml/2011/main" xmlns:a14="http://schemas.microsoft.com/office/drawing/2010/main" xmlns:m="http://schemas.openxmlformats.org/officeDocument/2006/math" xmlns="" val="1"/>
             </a:ext>
           </a:extLst>
         </p:spPr>
@@ -8804,7 +8810,7 @@
           </a:ln>
           <a:extLst>
             <a:ext uri="{C572A759-6A51-4108-AA02-DFA0A04FC94B}">
-              <ma14:wrappingTextBoxFlag xmlns="" xmlns:m="http://schemas.openxmlformats.org/officeDocument/2006/math" xmlns:a14="http://schemas.microsoft.com/office/drawing/2010/main" xmlns:ma14="http://schemas.microsoft.com/office/mac/drawingml/2011/main" val="1"/>
+              <ma14:wrappingTextBoxFlag xmlns:ma14="http://schemas.microsoft.com/office/mac/drawingml/2011/main" xmlns:a14="http://schemas.microsoft.com/office/drawing/2010/main" xmlns:m="http://schemas.openxmlformats.org/officeDocument/2006/math" xmlns="" val="1"/>
             </a:ext>
           </a:extLst>
         </p:spPr>
@@ -13860,7 +13866,7 @@
           </a:ln>
           <a:extLst>
             <a:ext uri="{C572A759-6A51-4108-AA02-DFA0A04FC94B}">
-              <ma14:wrappingTextBoxFlag xmlns="" xmlns:m="http://schemas.openxmlformats.org/officeDocument/2006/math" xmlns:a14="http://schemas.microsoft.com/office/drawing/2010/main" xmlns:ma14="http://schemas.microsoft.com/office/mac/drawingml/2011/main" val="1"/>
+              <ma14:wrappingTextBoxFlag xmlns:ma14="http://schemas.microsoft.com/office/mac/drawingml/2011/main" xmlns:a14="http://schemas.microsoft.com/office/drawing/2010/main" xmlns:m="http://schemas.openxmlformats.org/officeDocument/2006/math" xmlns="" val="1"/>
             </a:ext>
           </a:extLst>
         </p:spPr>
@@ -13906,7 +13912,7 @@
           </a:ln>
           <a:extLst>
             <a:ext uri="{C572A759-6A51-4108-AA02-DFA0A04FC94B}">
-              <ma14:wrappingTextBoxFlag xmlns="" xmlns:m="http://schemas.openxmlformats.org/officeDocument/2006/math" xmlns:a14="http://schemas.microsoft.com/office/drawing/2010/main" xmlns:ma14="http://schemas.microsoft.com/office/mac/drawingml/2011/main" val="1"/>
+              <ma14:wrappingTextBoxFlag xmlns:ma14="http://schemas.microsoft.com/office/mac/drawingml/2011/main" xmlns:a14="http://schemas.microsoft.com/office/drawing/2010/main" xmlns:m="http://schemas.openxmlformats.org/officeDocument/2006/math" xmlns="" val="1"/>
             </a:ext>
           </a:extLst>
         </p:spPr>
@@ -14226,7 +14232,7 @@
           <a:effectLst/>
           <a:extLst>
             <a:ext uri="{C572A759-6A51-4108-AA02-DFA0A04FC94B}">
-              <ma14:wrappingTextBoxFlag xmlns="" xmlns:m="http://schemas.openxmlformats.org/officeDocument/2006/math" xmlns:a14="http://schemas.microsoft.com/office/drawing/2010/main" xmlns:ma14="http://schemas.microsoft.com/office/mac/drawingml/2011/main" val="1"/>
+              <ma14:wrappingTextBoxFlag xmlns:ma14="http://schemas.microsoft.com/office/mac/drawingml/2011/main" xmlns:a14="http://schemas.microsoft.com/office/drawing/2010/main" xmlns:m="http://schemas.openxmlformats.org/officeDocument/2006/math" xmlns="" val="1"/>
             </a:ext>
           </a:extLst>
         </p:spPr>
@@ -14621,7 +14627,7 @@
           <a:effectLst/>
           <a:extLst>
             <a:ext uri="{C572A759-6A51-4108-AA02-DFA0A04FC94B}">
-              <ma14:wrappingTextBoxFlag xmlns="" xmlns:m="http://schemas.openxmlformats.org/officeDocument/2006/math" xmlns:a14="http://schemas.microsoft.com/office/drawing/2010/main" xmlns:ma14="http://schemas.microsoft.com/office/mac/drawingml/2011/main" val="1"/>
+              <ma14:wrappingTextBoxFlag xmlns:ma14="http://schemas.microsoft.com/office/mac/drawingml/2011/main" xmlns:a14="http://schemas.microsoft.com/office/drawing/2010/main" xmlns:m="http://schemas.openxmlformats.org/officeDocument/2006/math" xmlns="" val="1"/>
             </a:ext>
           </a:extLst>
         </p:spPr>
@@ -14898,7 +14904,7 @@
           <a:effectLst/>
           <a:extLst>
             <a:ext uri="{C572A759-6A51-4108-AA02-DFA0A04FC94B}">
-              <ma14:wrappingTextBoxFlag xmlns="" xmlns:m="http://schemas.openxmlformats.org/officeDocument/2006/math" xmlns:a14="http://schemas.microsoft.com/office/drawing/2010/main" xmlns:ma14="http://schemas.microsoft.com/office/mac/drawingml/2011/main" val="1"/>
+              <ma14:wrappingTextBoxFlag xmlns:ma14="http://schemas.microsoft.com/office/mac/drawingml/2011/main" xmlns:a14="http://schemas.microsoft.com/office/drawing/2010/main" xmlns:m="http://schemas.openxmlformats.org/officeDocument/2006/math" xmlns="" val="1"/>
             </a:ext>
           </a:extLst>
         </p:spPr>
@@ -15112,7 +15118,7 @@
           <a:effectLst/>
           <a:extLst>
             <a:ext uri="{C572A759-6A51-4108-AA02-DFA0A04FC94B}">
-              <ma14:wrappingTextBoxFlag xmlns="" xmlns:m="http://schemas.openxmlformats.org/officeDocument/2006/math" xmlns:a14="http://schemas.microsoft.com/office/drawing/2010/main" xmlns:ma14="http://schemas.microsoft.com/office/mac/drawingml/2011/main" val="1"/>
+              <ma14:wrappingTextBoxFlag xmlns:ma14="http://schemas.microsoft.com/office/mac/drawingml/2011/main" xmlns:a14="http://schemas.microsoft.com/office/drawing/2010/main" xmlns:m="http://schemas.openxmlformats.org/officeDocument/2006/math" xmlns="" val="1"/>
             </a:ext>
           </a:extLst>
         </p:spPr>
@@ -15416,7 +15422,7 @@
           <a:effectLst/>
           <a:extLst>
             <a:ext uri="{C572A759-6A51-4108-AA02-DFA0A04FC94B}">
-              <ma14:wrappingTextBoxFlag xmlns="" xmlns:m="http://schemas.openxmlformats.org/officeDocument/2006/math" xmlns:a14="http://schemas.microsoft.com/office/drawing/2010/main" xmlns:ma14="http://schemas.microsoft.com/office/mac/drawingml/2011/main" val="1"/>
+              <ma14:wrappingTextBoxFlag xmlns:ma14="http://schemas.microsoft.com/office/mac/drawingml/2011/main" xmlns:a14="http://schemas.microsoft.com/office/drawing/2010/main" xmlns:m="http://schemas.openxmlformats.org/officeDocument/2006/math" xmlns="" val="1"/>
             </a:ext>
           </a:extLst>
         </p:spPr>
@@ -17011,7 +17017,7 @@
           <a:effectLst/>
           <a:extLst>
             <a:ext uri="{C572A759-6A51-4108-AA02-DFA0A04FC94B}">
-              <ma14:wrappingTextBoxFlag xmlns="" xmlns:m="http://schemas.openxmlformats.org/officeDocument/2006/math" xmlns:a14="http://schemas.microsoft.com/office/drawing/2010/main" xmlns:ma14="http://schemas.microsoft.com/office/mac/drawingml/2011/main" val="1"/>
+              <ma14:wrappingTextBoxFlag xmlns:ma14="http://schemas.microsoft.com/office/mac/drawingml/2011/main" xmlns:a14="http://schemas.microsoft.com/office/drawing/2010/main" xmlns:m="http://schemas.openxmlformats.org/officeDocument/2006/math" xmlns="" val="1"/>
             </a:ext>
           </a:extLst>
         </p:spPr>

</xml_diff>